<commit_message>
updated poster with graphics
</commit_message>
<xml_diff>
--- a/Poster Board.pptx
+++ b/Poster Board.pptx
@@ -2006,7 +2006,7 @@
           <a:p>
             <a:fld id="{985D6BDF-9D0E-4E2B-85B8-D8F4790360C9}" type="datetimeFigureOut">
               <a:rPr lang="en-US" smtClean="0"/>
-              <a:t>5/21/2019</a:t>
+              <a:t>5/22/2019</a:t>
             </a:fld>
             <a:endParaRPr lang="en-US" dirty="0"/>
           </a:p>
@@ -2217,7 +2217,7 @@
           <a:p>
             <a:fld id="{985D6BDF-9D0E-4E2B-85B8-D8F4790360C9}" type="datetimeFigureOut">
               <a:rPr lang="en-US" smtClean="0"/>
-              <a:t>5/21/2019</a:t>
+              <a:t>5/22/2019</a:t>
             </a:fld>
             <a:endParaRPr lang="en-US" dirty="0"/>
           </a:p>
@@ -2912,13 +2912,10 @@
             </a:lvl9pPr>
           </a:lstStyle>
           <a:p>
-            <a:pPr eaLnBrk="1" hangingPunct="1"/>
-            <a:r>
-              <a:rPr lang="en-US" sz="2800" dirty="0">
-                <a:latin typeface="Calibri" pitchFamily="34" charset="0"/>
-              </a:rPr>
-              <a:t>   </a:t>
-            </a:r>
+            <a:pPr marL="457200" indent="-457200" eaLnBrk="1" hangingPunct="1">
+              <a:buFont typeface="Arial" panose="020B0604020202020204" pitchFamily="34" charset="0"/>
+              <a:buChar char="•"/>
+            </a:pPr>
             <a:r>
               <a:rPr lang="en-US" sz="3000" dirty="0">
                 <a:latin typeface="Calibri" pitchFamily="34" charset="0"/>
@@ -2927,12 +2924,27 @@
             </a:r>
           </a:p>
           <a:p>
-            <a:pPr eaLnBrk="1" hangingPunct="1"/>
+            <a:pPr marL="457200" indent="-457200" eaLnBrk="1" hangingPunct="1">
+              <a:buFont typeface="Arial" panose="020B0604020202020204" pitchFamily="34" charset="0"/>
+              <a:buChar char="•"/>
+            </a:pPr>
             <a:r>
               <a:rPr lang="en-US" sz="3000" dirty="0">
                 <a:latin typeface="Calibri" pitchFamily="34" charset="0"/>
               </a:rPr>
-              <a:t>   For many of these industries, the thermal properties of products are crucial to functionality. Therefore, it is critical to understand specific factors that influence these thermal properties.</a:t>
+              <a:t>For many of these industries, the thermal properties of products are crucial to functionality. Therefore, it is critical to understand specific factors that influence these thermal properties.</a:t>
+            </a:r>
+          </a:p>
+          <a:p>
+            <a:pPr marL="457200" indent="-457200" eaLnBrk="1" hangingPunct="1">
+              <a:buFont typeface="Arial" panose="020B0604020202020204" pitchFamily="34" charset="0"/>
+              <a:buChar char="•"/>
+            </a:pPr>
+            <a:r>
+              <a:rPr lang="en-US" sz="3000" dirty="0">
+                <a:latin typeface="Calibri" pitchFamily="34" charset="0"/>
+              </a:rPr>
+              <a:t>During the 3D printing process, thermal stresses creates distortions, known as warpage. Limited research has been done on solutions to the warpage problem in FDM printing.</a:t>
             </a:r>
           </a:p>
           <a:p>
@@ -2941,16 +2953,7 @@
               <a:rPr lang="en-US" sz="3000" dirty="0">
                 <a:latin typeface="Calibri" pitchFamily="34" charset="0"/>
               </a:rPr>
-              <a:t>   During the 3D printing process, thermal stresses creates distortions, known as warpage. Limited research has been done on solutions to the warpage problem in FDM printing.</a:t>
-            </a:r>
-          </a:p>
-          <a:p>
-            <a:pPr eaLnBrk="1" hangingPunct="1"/>
-            <a:r>
-              <a:rPr lang="en-US" sz="3000" dirty="0">
-                <a:latin typeface="Calibri" pitchFamily="34" charset="0"/>
-              </a:rPr>
-              <a:t>   This study aims to understand the relationship between infill parameters and the spatiotemporal temperature distribution during the printing process.</a:t>
+              <a:t>This study aims to understand the relationship between infill parameters and the spatiotemporal temperature distribution during the printing process.</a:t>
             </a:r>
           </a:p>
         </p:txBody>
@@ -3022,8 +3025,8 @@
         </p:nvSpPr>
         <p:spPr bwMode="auto">
           <a:xfrm>
-            <a:off x="11502203" y="14564486"/>
-            <a:ext cx="20848320" cy="4098501"/>
+            <a:off x="11521389" y="14564486"/>
+            <a:ext cx="20829133" cy="4357634"/>
           </a:xfrm>
           <a:prstGeom prst="rect">
             <a:avLst/>
@@ -3143,12 +3146,12 @@
             </a:lvl9pPr>
           </a:lstStyle>
           <a:p>
-            <a:pPr algn="ctr" eaLnBrk="1" hangingPunct="1"/>
+            <a:pPr eaLnBrk="1" hangingPunct="1"/>
             <a:r>
               <a:rPr lang="en-US" sz="3000" b="1" dirty="0">
                 <a:latin typeface="Calibri" pitchFamily="34" charset="0"/>
               </a:rPr>
-              <a:t>Table 2: </a:t>
+              <a:t> Table 2: </a:t>
             </a:r>
             <a:r>
               <a:rPr lang="en-US" sz="3000" dirty="0">
@@ -4501,7 +4504,7 @@
               </a:r>
               <a:r>
                 <a:rPr lang="en-US" sz="1600" dirty="0"/>
-                <a:t>Various Infill Percentages</a:t>
+                <a:t>Various infill percentages</a:t>
               </a:r>
             </a:p>
             <a:p>
@@ -5492,7 +5495,7 @@
             <p:spPr bwMode="auto">
               <a:xfrm>
                 <a:off x="33186119" y="1696401"/>
-                <a:ext cx="9144000" cy="10975843"/>
+                <a:ext cx="9144000" cy="11437508"/>
               </a:xfrm>
               <a:prstGeom prst="rect">
                 <a:avLst/>
@@ -5927,6 +5930,20 @@
               </a:p>
               <a:p>
                 <a:pPr eaLnBrk="1" hangingPunct="1"/>
+                <a:r>
+                  <a:rPr lang="en-US" sz="3000" b="1" dirty="0"/>
+                  <a:t>Table 2: </a:t>
+                </a:r>
+                <a:r>
+                  <a:rPr lang="en-US" sz="3000" dirty="0"/>
+                  <a:t>Welch’s Tests p-values and Test Statistics</a:t>
+                </a:r>
+                <a:endParaRPr lang="en-US" sz="3000" dirty="0">
+                  <a:latin typeface="Calibri" pitchFamily="34" charset="0"/>
+                </a:endParaRPr>
+              </a:p>
+              <a:p>
+                <a:pPr eaLnBrk="1" hangingPunct="1"/>
                 <a:endParaRPr lang="en-US" sz="3000" dirty="0">
                   <a:latin typeface="Calibri" pitchFamily="34" charset="0"/>
                 </a:endParaRPr>
@@ -6006,7 +6023,7 @@
             <p:spPr bwMode="auto">
               <a:xfrm>
                 <a:off x="33186119" y="1696401"/>
-                <a:ext cx="9144000" cy="10975843"/>
+                <a:ext cx="9144000" cy="11437508"/>
               </a:xfrm>
               <a:prstGeom prst="rect">
                 <a:avLst/>
@@ -6121,7 +6138,7 @@
         <p:spPr bwMode="auto">
           <a:xfrm>
             <a:off x="33186119" y="14616246"/>
-            <a:ext cx="9144000" cy="7171147"/>
+            <a:ext cx="9144000" cy="7478924"/>
           </a:xfrm>
           <a:prstGeom prst="rect">
             <a:avLst/>
@@ -6242,6 +6259,9 @@
           </a:lstStyle>
           <a:p>
             <a:pPr marL="457200" indent="-457200" eaLnBrk="1" hangingPunct="1">
+              <a:spcBef>
+                <a:spcPts val="1200"/>
+              </a:spcBef>
               <a:buFont typeface="Arial" panose="020B0604020202020204" pitchFamily="34" charset="0"/>
               <a:buChar char="•"/>
             </a:pPr>
@@ -6253,13 +6273,10 @@
             </a:r>
           </a:p>
           <a:p>
-            <a:pPr eaLnBrk="1" hangingPunct="1"/>
-            <a:endParaRPr lang="en-US" sz="2800" dirty="0">
-              <a:latin typeface="Calibri" pitchFamily="34" charset="0"/>
-            </a:endParaRPr>
-          </a:p>
-          <a:p>
             <a:pPr marL="457200" indent="-457200" eaLnBrk="1" hangingPunct="1">
+              <a:spcBef>
+                <a:spcPts val="1200"/>
+              </a:spcBef>
               <a:buFont typeface="Arial" panose="020B0604020202020204" pitchFamily="34" charset="0"/>
               <a:buChar char="•"/>
             </a:pPr>
@@ -6267,20 +6284,15 @@
               <a:rPr lang="en-US" sz="2800" dirty="0">
                 <a:latin typeface="Calibri" pitchFamily="34" charset="0"/>
               </a:rPr>
-              <a:t>This can be explained because theoretically, thermal conductivity increases with infill percentage since there is more plastic.</a:t>
+              <a:t>Figures 6, 7, and 8 show that as infill percentage increased, the “clustering” of the centers around the equilibrium point tended to increase as well, showing that greater infill percentages led to more uniformity in the temperature distribution.</a:t>
             </a:r>
           </a:p>
           <a:p>
-            <a:pPr marL="457200" indent="-457200" eaLnBrk="1" hangingPunct="1">
-              <a:buFont typeface="Arial" panose="020B0604020202020204" pitchFamily="34" charset="0"/>
-              <a:buChar char="•"/>
+            <a:pPr eaLnBrk="1" hangingPunct="1">
+              <a:spcBef>
+                <a:spcPts val="1200"/>
+              </a:spcBef>
             </a:pPr>
-            <a:endParaRPr lang="en-US" sz="2800" dirty="0">
-              <a:latin typeface="Calibri" pitchFamily="34" charset="0"/>
-            </a:endParaRPr>
-          </a:p>
-          <a:p>
-            <a:pPr eaLnBrk="1" hangingPunct="1"/>
             <a:r>
               <a:rPr lang="en-US" sz="2800" dirty="0">
                 <a:latin typeface="Calibri" pitchFamily="34" charset="0"/>
@@ -6369,8 +6381,8 @@
         </p:nvSpPr>
         <p:spPr bwMode="auto">
           <a:xfrm>
-            <a:off x="33186069" y="23340880"/>
-            <a:ext cx="9144000" cy="8586920"/>
+            <a:off x="33186069" y="24032633"/>
+            <a:ext cx="9144000" cy="7971367"/>
           </a:xfrm>
           <a:prstGeom prst="rect">
             <a:avLst/>
@@ -6491,6 +6503,9 @@
           </a:lstStyle>
           <a:p>
             <a:pPr marL="457200" indent="-457200" eaLnBrk="1" hangingPunct="1">
+              <a:spcBef>
+                <a:spcPts val="1200"/>
+              </a:spcBef>
               <a:buFont typeface="Arial" panose="020B0604020202020204" pitchFamily="34" charset="0"/>
               <a:buChar char="•"/>
             </a:pPr>
@@ -6503,15 +6518,9 @@
           </a:p>
           <a:p>
             <a:pPr marL="457200" indent="-457200" eaLnBrk="1" hangingPunct="1">
-              <a:buFont typeface="Arial" panose="020B0604020202020204" pitchFamily="34" charset="0"/>
-              <a:buChar char="•"/>
-            </a:pPr>
-            <a:endParaRPr lang="en-US" sz="3000" dirty="0">
-              <a:latin typeface="Calibri" pitchFamily="34" charset="0"/>
-            </a:endParaRPr>
-          </a:p>
-          <a:p>
-            <a:pPr marL="457200" indent="-457200" eaLnBrk="1" hangingPunct="1">
+              <a:spcBef>
+                <a:spcPts val="1200"/>
+              </a:spcBef>
               <a:buFont typeface="Arial" panose="020B0604020202020204" pitchFamily="34" charset="0"/>
               <a:buChar char="•"/>
             </a:pPr>
@@ -6524,23 +6533,17 @@
           </a:p>
           <a:p>
             <a:pPr marL="457200" indent="-457200" eaLnBrk="1" hangingPunct="1">
+              <a:spcBef>
+                <a:spcPts val="1200"/>
+              </a:spcBef>
               <a:buFont typeface="Arial" panose="020B0604020202020204" pitchFamily="34" charset="0"/>
               <a:buChar char="•"/>
             </a:pPr>
-            <a:endParaRPr lang="en-US" sz="3000" dirty="0">
-              <a:latin typeface="Calibri" pitchFamily="34" charset="0"/>
-            </a:endParaRPr>
-          </a:p>
-          <a:p>
-            <a:pPr marL="457200" indent="-457200" eaLnBrk="1" hangingPunct="1">
-              <a:buFont typeface="Arial" panose="020B0604020202020204" pitchFamily="34" charset="0"/>
-              <a:buChar char="•"/>
-            </a:pPr>
             <a:r>
               <a:rPr lang="en-US" sz="3000" dirty="0">
                 <a:latin typeface="Calibri" pitchFamily="34" charset="0"/>
               </a:rPr>
-              <a:t>As temperature is a scalar function, to actually be able to accurately analyze the temperature gradients in this experiment, the function must be known. Future research on finding this function using scattered, discrete temperature values can be conducted, such as by using Deep Learning models like Artificial Neural Networks to produce mapping functions for the data.</a:t>
+              <a:t>As temperature is a scalar function, to accurately analyze the temperature gradients in this experiment, the function must be known. Future research on finding this function using scattered, discrete temperature values can be conducted, such as by using Deep Learning models like Artificial Neural Networks to produce mapping functions for the data.</a:t>
             </a:r>
           </a:p>
         </p:txBody>
@@ -6559,7 +6562,7 @@
         </p:nvSpPr>
         <p:spPr>
           <a:xfrm>
-            <a:off x="33186019" y="22059634"/>
+            <a:off x="33186019" y="22751387"/>
             <a:ext cx="9144000" cy="1264196"/>
           </a:xfrm>
           <a:prstGeom prst="rect">
@@ -6909,7 +6912,7 @@
             </a:r>
             <a:r>
               <a:rPr lang="en-US" sz="2000" dirty="0"/>
-              <a:t>CAD Model of Template Disc</a:t>
+              <a:t>CAD model of template disc</a:t>
             </a:r>
             <a:endParaRPr lang="en-US" sz="2000" b="1" dirty="0"/>
           </a:p>
@@ -6950,7 +6953,7 @@
             </a:r>
             <a:r>
               <a:rPr lang="en-US" sz="2000" dirty="0"/>
-              <a:t>Embedding Thermistors during Printing</a:t>
+              <a:t>Embedding thermistors during printing</a:t>
             </a:r>
             <a:endParaRPr lang="en-US" sz="2000" b="1" dirty="0"/>
           </a:p>
@@ -7226,13 +7229,13 @@
           <p:nvPr>
             <p:extLst>
               <p:ext uri="{D42A27DB-BD31-4B8C-83A1-F6EECF244321}">
-                <p14:modId xmlns:p14="http://schemas.microsoft.com/office/powerpoint/2010/main" val="2284160622"/>
+                <p14:modId xmlns:p14="http://schemas.microsoft.com/office/powerpoint/2010/main" val="1683919661"/>
               </p:ext>
             </p:extLst>
           </p:nvPr>
         </p:nvGraphicFramePr>
         <p:xfrm>
-          <a:off x="16502930" y="15265156"/>
+          <a:off x="11787822" y="15407961"/>
           <a:ext cx="10885239" cy="2947747"/>
         </p:xfrm>
         <a:graphic>
@@ -9253,13 +9256,13 @@
           <p:nvPr>
             <p:extLst>
               <p:ext uri="{D42A27DB-BD31-4B8C-83A1-F6EECF244321}">
-                <p14:modId xmlns:p14="http://schemas.microsoft.com/office/powerpoint/2010/main" val="3592559122"/>
+                <p14:modId xmlns:p14="http://schemas.microsoft.com/office/powerpoint/2010/main" val="1838600439"/>
               </p:ext>
             </p:extLst>
           </p:nvPr>
         </p:nvGraphicFramePr>
         <p:xfrm>
-          <a:off x="33595666" y="7855229"/>
+          <a:off x="33595666" y="8305800"/>
           <a:ext cx="8324706" cy="4389120"/>
         </p:xfrm>
         <a:graphic>
@@ -9675,11 +9678,11 @@
             <a:pPr algn="ctr"/>
             <a:r>
               <a:rPr lang="en-US" sz="1800" b="1" dirty="0"/>
-              <a:t>Figure 6:</a:t>
+              <a:t>Figure 7:</a:t>
             </a:r>
             <a:r>
               <a:rPr lang="en-US" sz="1800" dirty="0"/>
-              <a:t> 20% Infill Temperature Centers, STD</a:t>
+              <a:t> 20% infill temperature centers, STD</a:t>
             </a:r>
             <a:r>
               <a:rPr lang="en-US" sz="1800" baseline="-25000" dirty="0"/>
@@ -9732,11 +9735,11 @@
             <a:pPr algn="ctr"/>
             <a:r>
               <a:rPr lang="en-US" sz="1800" b="1" dirty="0"/>
-              <a:t>Figure 5:</a:t>
+              <a:t>Figure 6:</a:t>
             </a:r>
             <a:r>
               <a:rPr lang="en-US" sz="1800" dirty="0"/>
-              <a:t> 10% Infill Temperature Centers, STD</a:t>
+              <a:t> 10% infill temperature centers, STD</a:t>
             </a:r>
             <a:r>
               <a:rPr lang="en-US" sz="1800" baseline="-25000" dirty="0"/>
@@ -9789,11 +9792,11 @@
             <a:pPr algn="ctr"/>
             <a:r>
               <a:rPr lang="en-US" sz="1800" b="1" dirty="0"/>
-              <a:t>Figure 7:</a:t>
+              <a:t>Figure 8:</a:t>
             </a:r>
             <a:r>
               <a:rPr lang="en-US" sz="1800" dirty="0"/>
-              <a:t> 30% Infill Temperature Centers, STD</a:t>
+              <a:t> 30% Infill temperature centers, STD</a:t>
             </a:r>
             <a:r>
               <a:rPr lang="en-US" sz="1800" baseline="-25000" dirty="0"/>
@@ -9923,6 +9926,83 @@
           </a:prstGeom>
         </p:spPr>
       </p:pic>
+      <p:pic>
+        <p:nvPicPr>
+          <p:cNvPr id="5" name="Picture 4" descr="A screenshot of a cell phone&#10;&#10;Description automatically generated">
+            <a:extLst>
+              <a:ext uri="{FF2B5EF4-FFF2-40B4-BE49-F238E27FC236}">
+                <a16:creationId xmlns:a16="http://schemas.microsoft.com/office/drawing/2014/main" id="{1FF163D6-2E97-4C56-AA05-BDB71AC74B8F}"/>
+              </a:ext>
+            </a:extLst>
+          </p:cNvPr>
+          <p:cNvPicPr>
+            <a:picLocks noChangeAspect="1"/>
+          </p:cNvPicPr>
+          <p:nvPr/>
+        </p:nvPicPr>
+        <p:blipFill>
+          <a:blip r:embed="rId11">
+            <a:extLst>
+              <a:ext uri="{28A0092B-C50C-407E-A947-70E740481C1C}">
+                <a14:useLocalDpi xmlns:a14="http://schemas.microsoft.com/office/drawing/2010/main" val="0"/>
+              </a:ext>
+            </a:extLst>
+          </a:blip>
+          <a:stretch>
+            <a:fillRect/>
+          </a:stretch>
+        </p:blipFill>
+        <p:spPr>
+          <a:xfrm>
+            <a:off x="26573308" y="14800322"/>
+            <a:ext cx="5642155" cy="3963975"/>
+          </a:xfrm>
+          <a:prstGeom prst="rect">
+            <a:avLst/>
+          </a:prstGeom>
+        </p:spPr>
+      </p:pic>
+      <p:sp>
+        <p:nvSpPr>
+          <p:cNvPr id="53" name="TextBox 52">
+            <a:extLst>
+              <a:ext uri="{FF2B5EF4-FFF2-40B4-BE49-F238E27FC236}">
+                <a16:creationId xmlns:a16="http://schemas.microsoft.com/office/drawing/2014/main" id="{646F93BA-02A5-47FD-B234-C75B7C4D49AB}"/>
+              </a:ext>
+            </a:extLst>
+          </p:cNvPr>
+          <p:cNvSpPr txBox="1"/>
+          <p:nvPr/>
+        </p:nvSpPr>
+        <p:spPr>
+          <a:xfrm>
+            <a:off x="23850600" y="15283933"/>
+            <a:ext cx="2587649" cy="1938992"/>
+          </a:xfrm>
+          <a:prstGeom prst="rect">
+            <a:avLst/>
+          </a:prstGeom>
+          <a:noFill/>
+        </p:spPr>
+        <p:txBody>
+          <a:bodyPr wrap="square" rtlCol="0">
+            <a:spAutoFit/>
+          </a:bodyPr>
+          <a:lstStyle/>
+          <a:p>
+            <a:pPr algn="ctr"/>
+            <a:r>
+              <a:rPr lang="en-US" sz="3000" b="1" dirty="0"/>
+              <a:t>Figure 5: </a:t>
+            </a:r>
+            <a:r>
+              <a:rPr lang="en-US" sz="3000" dirty="0"/>
+              <a:t>Graph of Temperature vs. Time for all thermistors</a:t>
+            </a:r>
+            <a:endParaRPr lang="en-US" sz="3000" b="1" dirty="0"/>
+          </a:p>
+        </p:txBody>
+      </p:sp>
     </p:spTree>
     <p:extLst>
       <p:ext uri="{BB962C8B-B14F-4D97-AF65-F5344CB8AC3E}">

</xml_diff>